<commit_message>
Update assign to me
</commit_message>
<xml_diff>
--- a/doc/Presentation of ChatGPT Example.pptx
+++ b/doc/Presentation of ChatGPT Example.pptx
@@ -227,7 +227,7 @@
           <a:p>
             <a:fld id="{BB37BDEB-D08A-4BCC-82C3-65677B6346BB}" type="datetimeFigureOut">
               <a:rPr lang="en-US" smtClean="0"/>
-              <a:t>10/03/2025</a:t>
+              <a:t>02/04/2025</a:t>
             </a:fld>
             <a:endParaRPr lang="en-US"/>
           </a:p>
@@ -404,7 +404,7 @@
           <a:p>
             <a:fld id="{D64182BB-4E27-4552-8EE4-33C8EF731305}" type="datetimeFigureOut">
               <a:rPr lang="en-US" smtClean="0"/>
-              <a:t>10/03/2025</a:t>
+              <a:t>02/04/2025</a:t>
             </a:fld>
             <a:endParaRPr lang="en-US"/>
           </a:p>
@@ -7163,7 +7163,7 @@
           <a:p>
             <a:fld id="{ED291B17-9318-49DB-B28B-6E5994AE9581}" type="datetime1">
               <a:rPr lang="en-US" smtClean="0"/>
-              <a:t>10/03/2025</a:t>
+              <a:t>02/04/2025</a:t>
             </a:fld>
             <a:endParaRPr lang="en-US" dirty="0"/>
           </a:p>
@@ -7322,7 +7322,7 @@
           <a:p>
             <a:fld id="{4EDE50D6-574B-40AF-946F-D52A04ADE379}" type="datetime1">
               <a:rPr lang="en-US" smtClean="0"/>
-              <a:t>10/03/2025</a:t>
+              <a:t>02/04/2025</a:t>
             </a:fld>
             <a:endParaRPr lang="en-US" dirty="0"/>
           </a:p>
@@ -7734,7 +7734,7 @@
           <a:p>
             <a:fld id="{4EDE50D6-574B-40AF-946F-D52A04ADE379}" type="datetime1">
               <a:rPr lang="en-US" smtClean="0"/>
-              <a:t>10/03/2025</a:t>
+              <a:t>02/04/2025</a:t>
             </a:fld>
             <a:endParaRPr lang="en-US" dirty="0"/>
           </a:p>
@@ -8210,7 +8210,7 @@
           <a:p>
             <a:fld id="{4EDE50D6-574B-40AF-946F-D52A04ADE379}" type="datetime1">
               <a:rPr lang="en-US" smtClean="0"/>
-              <a:t>10/03/2025</a:t>
+              <a:t>02/04/2025</a:t>
             </a:fld>
             <a:endParaRPr lang="en-US" dirty="0"/>
           </a:p>
@@ -8659,7 +8659,7 @@
           <a:p>
             <a:fld id="{4EDE50D6-574B-40AF-946F-D52A04ADE379}" type="datetime1">
               <a:rPr lang="en-US" smtClean="0"/>
-              <a:t>10/03/2025</a:t>
+              <a:t>02/04/2025</a:t>
             </a:fld>
             <a:endParaRPr lang="en-US" dirty="0"/>
           </a:p>
@@ -8891,7 +8891,7 @@
           <a:p>
             <a:fld id="{4EDE50D6-574B-40AF-946F-D52A04ADE379}" type="datetime1">
               <a:rPr lang="en-US" noProof="0" smtClean="0"/>
-              <a:t>10/03/2025</a:t>
+              <a:t>02/04/2025</a:t>
             </a:fld>
             <a:endParaRPr lang="en-US" noProof="0"/>
           </a:p>
@@ -9589,7 +9589,7 @@
           <a:p>
             <a:fld id="{4EDE50D6-574B-40AF-946F-D52A04ADE379}" type="datetime1">
               <a:rPr lang="en-US" noProof="0" smtClean="0"/>
-              <a:t>10/03/2025</a:t>
+              <a:t>02/04/2025</a:t>
             </a:fld>
             <a:endParaRPr lang="en-US" noProof="0"/>
           </a:p>
@@ -9946,7 +9946,7 @@
           <a:p>
             <a:fld id="{4EDE50D6-574B-40AF-946F-D52A04ADE379}" type="datetime1">
               <a:rPr lang="en-US" noProof="0" smtClean="0"/>
-              <a:t>10/03/2025</a:t>
+              <a:t>02/04/2025</a:t>
             </a:fld>
             <a:endParaRPr lang="en-US" noProof="0"/>
           </a:p>
@@ -10508,7 +10508,7 @@
           <a:p>
             <a:fld id="{78DD82B9-B8EE-4375-B6FF-88FA6ABB15D9}" type="datetime1">
               <a:rPr lang="en-US" smtClean="0"/>
-              <a:t>10/03/2025</a:t>
+              <a:t>02/04/2025</a:t>
             </a:fld>
             <a:endParaRPr lang="en-US" dirty="0"/>
           </a:p>
@@ -10856,7 +10856,7 @@
           <a:p>
             <a:fld id="{78DD82B9-B8EE-4375-B6FF-88FA6ABB15D9}" type="datetime1">
               <a:rPr lang="en-US" smtClean="0"/>
-              <a:t>10/03/2025</a:t>
+              <a:t>02/04/2025</a:t>
             </a:fld>
             <a:endParaRPr lang="en-US" dirty="0"/>
           </a:p>
@@ -11259,7 +11259,7 @@
           <a:p>
             <a:fld id="{B2497495-0637-405E-AE64-5CC7506D51F5}" type="datetime1">
               <a:rPr lang="en-US" smtClean="0"/>
-              <a:t>10/03/2025</a:t>
+              <a:t>02/04/2025</a:t>
             </a:fld>
             <a:endParaRPr lang="en-US" dirty="0"/>
           </a:p>
@@ -11552,7 +11552,7 @@
           <a:p>
             <a:fld id="{7BFFD690-9426-415D-8B65-26881E07B2D4}" type="datetime1">
               <a:rPr lang="en-US" smtClean="0"/>
-              <a:t>10/03/2025</a:t>
+              <a:t>02/04/2025</a:t>
             </a:fld>
             <a:endParaRPr lang="en-US" dirty="0"/>
           </a:p>
@@ -12046,7 +12046,7 @@
           <a:p>
             <a:fld id="{04C4989A-474C-40DE-95B9-011C28B71673}" type="datetime1">
               <a:rPr lang="en-US" smtClean="0"/>
-              <a:t>10/03/2025</a:t>
+              <a:t>02/04/2025</a:t>
             </a:fld>
             <a:endParaRPr lang="en-US" dirty="0"/>
           </a:p>
@@ -12350,7 +12350,7 @@
           <a:p>
             <a:fld id="{5DB4ED54-5B5E-4A04-93D3-5772E3CE3818}" type="datetime1">
               <a:rPr lang="en-US" smtClean="0"/>
-              <a:t>10/03/2025</a:t>
+              <a:t>02/04/2025</a:t>
             </a:fld>
             <a:endParaRPr lang="en-US" dirty="0"/>
           </a:p>
@@ -12537,7 +12537,7 @@
           <a:p>
             <a:fld id="{4EDE50D6-574B-40AF-946F-D52A04ADE379}" type="datetime1">
               <a:rPr lang="en-US" smtClean="0"/>
-              <a:t>10/03/2025</a:t>
+              <a:t>02/04/2025</a:t>
             </a:fld>
             <a:endParaRPr lang="en-US" dirty="0"/>
           </a:p>
@@ -12749,7 +12749,7 @@
           <a:p>
             <a:fld id="{4EDE50D6-574B-40AF-946F-D52A04ADE379}" type="datetime1">
               <a:rPr lang="en-US" smtClean="0"/>
-              <a:t>10/03/2025</a:t>
+              <a:t>02/04/2025</a:t>
             </a:fld>
             <a:endParaRPr lang="en-US" dirty="0"/>
           </a:p>
@@ -13181,7 +13181,7 @@
           <a:p>
             <a:fld id="{ED291B17-9318-49DB-B28B-6E5994AE9581}" type="datetime1">
               <a:rPr lang="en-US" smtClean="0"/>
-              <a:t>10/03/2025</a:t>
+              <a:t>02/04/2025</a:t>
             </a:fld>
             <a:endParaRPr lang="en-US" dirty="0"/>
           </a:p>
@@ -13774,8 +13774,8 @@
               <a:t> </a:t>
             </a:r>
             <a:r>
-              <a:rPr lang="th-TH" sz="2400" dirty="0"/>
-              <a:t>มีนาคม </a:t>
+              <a:rPr lang="th-TH" sz="2400" smtClean="0"/>
+              <a:t>ดดดด </a:t>
             </a:r>
             <a:r>
               <a:rPr lang="en-US" sz="2400" dirty="0"/>
@@ -16291,14 +16291,7 @@
                 <a:latin typeface="Cordia New" panose="020B0304020202020204" pitchFamily="34" charset="-34"/>
                 <a:cs typeface="Cordia New" panose="020B0304020202020204" pitchFamily="34" charset="-34"/>
               </a:rPr>
-              <a:t>เพื่อสร้างเพลง </a:t>
-            </a:r>
-            <a:r>
-              <a:rPr lang="th-TH" sz="2600" b="1" u="sng" dirty="0" smtClean="0">
-                <a:latin typeface="Cordia New" panose="020B0304020202020204" pitchFamily="34" charset="-34"/>
-                <a:cs typeface="Cordia New" panose="020B0304020202020204" pitchFamily="34" charset="-34"/>
-              </a:rPr>
-              <a:t>โดยเลื่อนลงมาข้างล่างจนเห็นปุ่ม </a:t>
+              <a:t>เพื่อสร้างเพลง โดยเลื่อนลงมาข้างล่างจนเห็นปุ่ม </a:t>
             </a:r>
             <a:r>
               <a:rPr lang="en-US" sz="2600" b="1" u="sng" dirty="0" smtClean="0">
@@ -17359,15 +17352,6 @@
 </file>
 
 <file path=customXml/item2.xml><?xml version="1.0" encoding="utf-8"?>
-<p:properties xmlns:p="http://schemas.microsoft.com/office/2006/metadata/properties" xmlns:xsi="http://www.w3.org/2001/XMLSchema-instance" xmlns:pc="http://schemas.microsoft.com/office/infopath/2007/PartnerControls">
-  <documentManagement>
-    <Status xmlns="71af3243-3dd4-4a8d-8c0d-dd76da1f02a5">Not started</Status>
-    <MediaServiceKeyPoints xmlns="71af3243-3dd4-4a8d-8c0d-dd76da1f02a5" xsi:nil="true"/>
-  </documentManagement>
-</p:properties>
-</file>
-
-<file path=customXml/item3.xml><?xml version="1.0" encoding="utf-8"?>
 <ct:contentTypeSchema xmlns:ct="http://schemas.microsoft.com/office/2006/metadata/contentType" xmlns:ma="http://schemas.microsoft.com/office/2006/metadata/properties/metaAttributes" ct:_="" ma:_="" ma:contentTypeName="Document" ma:contentTypeID="0x01010079F111ED35F8CC479449609E8A0923A6" ma:contentTypeVersion="12" ma:contentTypeDescription="Create a new document." ma:contentTypeScope="" ma:versionID="fa6e671f1cd7e4d96ff9652be322dd5e">
   <xsd:schema xmlns:xsd="http://www.w3.org/2001/XMLSchema" xmlns:xs="http://www.w3.org/2001/XMLSchema" xmlns:p="http://schemas.microsoft.com/office/2006/metadata/properties" xmlns:ns2="71af3243-3dd4-4a8d-8c0d-dd76da1f02a5" xmlns:ns3="16c05727-aa75-4e4a-9b5f-8a80a1165891" targetNamespace="http://schemas.microsoft.com/office/2006/metadata/properties" ma:root="true" ma:fieldsID="4e2496f70b101db0b8013f30a071bbf7" ns2:_="" ns3:_="">
     <xsd:import namespace="71af3243-3dd4-4a8d-8c0d-dd76da1f02a5"/>
@@ -17588,6 +17572,15 @@
 </ct:contentTypeSchema>
 </file>
 
+<file path=customXml/item3.xml><?xml version="1.0" encoding="utf-8"?>
+<p:properties xmlns:p="http://schemas.microsoft.com/office/2006/metadata/properties" xmlns:xsi="http://www.w3.org/2001/XMLSchema-instance" xmlns:pc="http://schemas.microsoft.com/office/infopath/2007/PartnerControls">
+  <documentManagement>
+    <Status xmlns="71af3243-3dd4-4a8d-8c0d-dd76da1f02a5">Not started</Status>
+    <MediaServiceKeyPoints xmlns="71af3243-3dd4-4a8d-8c0d-dd76da1f02a5" xsi:nil="true"/>
+  </documentManagement>
+</p:properties>
+</file>
+
 <file path=customXml/itemProps1.xml><?xml version="1.0" encoding="utf-8"?>
 <ds:datastoreItem xmlns:ds="http://schemas.openxmlformats.org/officeDocument/2006/customXml" ds:itemID="{8435A0B9-5F49-415F-9BEE-591FDACE98D1}">
   <ds:schemaRefs>
@@ -17597,23 +17590,6 @@
 </file>
 
 <file path=customXml/itemProps2.xml><?xml version="1.0" encoding="utf-8"?>
-<ds:datastoreItem xmlns:ds="http://schemas.openxmlformats.org/officeDocument/2006/customXml" ds:itemID="{ADC43B05-D266-4257-98DE-FF9D8CEDAE76}">
-  <ds:schemaRefs>
-    <ds:schemaRef ds:uri="http://schemas.microsoft.com/office/2006/documentManagement/types"/>
-    <ds:schemaRef ds:uri="71af3243-3dd4-4a8d-8c0d-dd76da1f02a5"/>
-    <ds:schemaRef ds:uri="http://purl.org/dc/dcmitype/"/>
-    <ds:schemaRef ds:uri="16c05727-aa75-4e4a-9b5f-8a80a1165891"/>
-    <ds:schemaRef ds:uri="http://purl.org/dc/terms/"/>
-    <ds:schemaRef ds:uri="http://schemas.microsoft.com/office/2006/metadata/properties"/>
-    <ds:schemaRef ds:uri="http://purl.org/dc/elements/1.1/"/>
-    <ds:schemaRef ds:uri="http://schemas.microsoft.com/office/infopath/2007/PartnerControls"/>
-    <ds:schemaRef ds:uri="http://schemas.openxmlformats.org/package/2006/metadata/core-properties"/>
-    <ds:schemaRef ds:uri="http://www.w3.org/XML/1998/namespace"/>
-  </ds:schemaRefs>
-</ds:datastoreItem>
-</file>
-
-<file path=customXml/itemProps3.xml><?xml version="1.0" encoding="utf-8"?>
 <ds:datastoreItem xmlns:ds="http://schemas.openxmlformats.org/officeDocument/2006/customXml" ds:itemID="{D76AEDE5-E9AF-4E9F-97C3-19B848D35AB4}">
   <ds:schemaRefs>
     <ds:schemaRef ds:uri="http://schemas.microsoft.com/office/2006/metadata/contentType"/>
@@ -17630,4 +17606,21 @@
     <ds:schemaRef ds:uri="http://schemas.microsoft.com/internal/obd"/>
   </ds:schemaRefs>
 </ds:datastoreItem>
+</file>
+
+<file path=customXml/itemProps3.xml><?xml version="1.0" encoding="utf-8"?>
+<ds:datastoreItem xmlns:ds="http://schemas.openxmlformats.org/officeDocument/2006/customXml" ds:itemID="{ADC43B05-D266-4257-98DE-FF9D8CEDAE76}">
+  <ds:schemaRefs>
+    <ds:schemaRef ds:uri="http://schemas.microsoft.com/office/2006/documentManagement/types"/>
+    <ds:schemaRef ds:uri="71af3243-3dd4-4a8d-8c0d-dd76da1f02a5"/>
+    <ds:schemaRef ds:uri="http://purl.org/dc/dcmitype/"/>
+    <ds:schemaRef ds:uri="16c05727-aa75-4e4a-9b5f-8a80a1165891"/>
+    <ds:schemaRef ds:uri="http://purl.org/dc/terms/"/>
+    <ds:schemaRef ds:uri="http://schemas.microsoft.com/office/2006/metadata/properties"/>
+    <ds:schemaRef ds:uri="http://purl.org/dc/elements/1.1/"/>
+    <ds:schemaRef ds:uri="http://schemas.microsoft.com/office/infopath/2007/PartnerControls"/>
+    <ds:schemaRef ds:uri="http://schemas.openxmlformats.org/package/2006/metadata/core-properties"/>
+    <ds:schemaRef ds:uri="http://www.w3.org/XML/1998/namespace"/>
+  </ds:schemaRefs>
+</ds:datastoreItem>
 </file>
</xml_diff>